<commit_message>
fixed type in slide
</commit_message>
<xml_diff>
--- a/eq.pptx
+++ b/eq.pptx
@@ -238,7 +238,7 @@
           </a:lstStyle>
           <a:p>
             <a:fld id="{1FBEFB9F-C25B-424C-8B67-E9F1C8FBE4C3}" type="datetimeFigureOut">
-              <a:t>18/02/13</a:t>
+              <a:t>23/02/13</a:t>
             </a:fld>
             <a:endParaRPr lang="en-US"/>
           </a:p>
@@ -1556,7 +1556,7 @@
             <a:fld id="{28E80666-FB37-4B36-9149-507F3B0178E3}" type="datetimeFigureOut">
               <a:rPr lang="en-US" smtClean="0"/>
               <a:pPr/>
-              <a:t>18/02/13</a:t>
+              <a:t>23/02/13</a:t>
             </a:fld>
             <a:endParaRPr lang="en-US"/>
           </a:p>
@@ -1740,7 +1740,7 @@
           <a:lstStyle/>
           <a:p>
             <a:fld id="{BA5979CA-FDD1-AA4F-AD03-C8B84A165D94}" type="datetimeFigureOut">
-              <a:t>18/02/13</a:t>
+              <a:t>23/02/13</a:t>
             </a:fld>
             <a:endParaRPr lang="en-US"/>
           </a:p>
@@ -1924,7 +1924,7 @@
           <a:lstStyle/>
           <a:p>
             <a:fld id="{BA5979CA-FDD1-AA4F-AD03-C8B84A165D94}" type="datetimeFigureOut">
-              <a:t>18/02/13</a:t>
+              <a:t>23/02/13</a:t>
             </a:fld>
             <a:endParaRPr lang="en-US"/>
           </a:p>
@@ -2017,7 +2017,7 @@
           <a:lstStyle/>
           <a:p>
             <a:fld id="{BA5979CA-FDD1-AA4F-AD03-C8B84A165D94}" type="datetimeFigureOut">
-              <a:t>18/02/13</a:t>
+              <a:t>23/02/13</a:t>
             </a:fld>
             <a:endParaRPr lang="en-US"/>
           </a:p>
@@ -2269,7 +2269,7 @@
             <a:fld id="{28E80666-FB37-4B36-9149-507F3B0178E3}" type="datetimeFigureOut">
               <a:rPr lang="en-US" smtClean="0"/>
               <a:pPr/>
-              <a:t>18/02/13</a:t>
+              <a:t>23/02/13</a:t>
             </a:fld>
             <a:endParaRPr lang="en-US"/>
           </a:p>
@@ -2577,7 +2577,7 @@
           <a:lstStyle/>
           <a:p>
             <a:fld id="{BA5979CA-FDD1-AA4F-AD03-C8B84A165D94}" type="datetimeFigureOut">
-              <a:t>18/02/13</a:t>
+              <a:t>23/02/13</a:t>
             </a:fld>
             <a:endParaRPr lang="en-US"/>
           </a:p>
@@ -3017,7 +3017,7 @@
           <a:lstStyle/>
           <a:p>
             <a:fld id="{BA5979CA-FDD1-AA4F-AD03-C8B84A165D94}" type="datetimeFigureOut">
-              <a:t>18/02/13</a:t>
+              <a:t>23/02/13</a:t>
             </a:fld>
             <a:endParaRPr lang="en-US"/>
           </a:p>
@@ -3141,7 +3141,7 @@
           <a:lstStyle/>
           <a:p>
             <a:fld id="{BA5979CA-FDD1-AA4F-AD03-C8B84A165D94}" type="datetimeFigureOut">
-              <a:t>18/02/13</a:t>
+              <a:t>23/02/13</a:t>
             </a:fld>
             <a:endParaRPr lang="en-US"/>
           </a:p>
@@ -3234,7 +3234,7 @@
           <a:lstStyle/>
           <a:p>
             <a:fld id="{BA5979CA-FDD1-AA4F-AD03-C8B84A165D94}" type="datetimeFigureOut">
-              <a:t>18/02/13</a:t>
+              <a:t>23/02/13</a:t>
             </a:fld>
             <a:endParaRPr lang="en-US"/>
           </a:p>
@@ -3518,7 +3518,7 @@
           <a:lstStyle/>
           <a:p>
             <a:fld id="{BA5979CA-FDD1-AA4F-AD03-C8B84A165D94}" type="datetimeFigureOut">
-              <a:t>18/02/13</a:t>
+              <a:t>23/02/13</a:t>
             </a:fld>
             <a:endParaRPr lang="en-US"/>
           </a:p>
@@ -3778,7 +3778,7 @@
           <a:lstStyle/>
           <a:p>
             <a:fld id="{BA5979CA-FDD1-AA4F-AD03-C8B84A165D94}" type="datetimeFigureOut">
-              <a:t>18/02/13</a:t>
+              <a:t>23/02/13</a:t>
             </a:fld>
             <a:endParaRPr lang="en-US"/>
           </a:p>
@@ -3894,7 +3894,7 @@
           </a:lstStyle>
           <a:p>
             <a:fld id="{BA5979CA-FDD1-AA4F-AD03-C8B84A165D94}" type="datetimeFigureOut">
-              <a:t>18/02/13</a:t>
+              <a:t>23/02/13</a:t>
             </a:fld>
             <a:endParaRPr lang="en-US"/>
           </a:p>
@@ -8319,7 +8319,6 @@
               <a:rPr lang="en-US"/>
               <a:t>Object</a:t>
             </a:r>
-            <a:endParaRPr lang="en-US"/>
           </a:p>
         </p:txBody>
       </p:sp>
@@ -8361,7 +8360,6 @@
               <a:rPr lang="en-US"/>
               <a:t>Pair&lt;A, B&gt;</a:t>
             </a:r>
-            <a:endParaRPr lang="en-US"/>
           </a:p>
         </p:txBody>
       </p:sp>
@@ -8521,7 +8519,6 @@
               <a:rPr lang="en-US"/>
               <a:t>Eq&lt;Pair&lt;...&gt;&gt;</a:t>
             </a:r>
-            <a:endParaRPr lang="en-US"/>
           </a:p>
         </p:txBody>
       </p:sp>
@@ -8640,7 +8637,6 @@
               <a:rPr lang="en-US"/>
               <a:t>Pair&lt;A, B&gt;</a:t>
             </a:r>
-            <a:endParaRPr lang="en-US"/>
           </a:p>
         </p:txBody>
       </p:sp>
@@ -8800,7 +8796,6 @@
               <a:rPr lang="en-US"/>
               <a:t>instance Eq Pair</a:t>
             </a:r>
-            <a:endParaRPr lang="en-US"/>
           </a:p>
         </p:txBody>
       </p:sp>
@@ -9797,7 +9792,7 @@
                 <a:latin typeface="Source Code Pro"/>
                 <a:cs typeface="Source Code Pro"/>
               </a:rPr>
-              <a:t>  (==) :: a</a:t>
+              <a:t>  (==) :: a -&gt; a -&gt; Bool</a:t>
             </a:r>
           </a:p>
           <a:p>
@@ -9907,7 +9902,6 @@
               <a:rPr lang="en-US"/>
               <a:t>Object</a:t>
             </a:r>
-            <a:endParaRPr lang="en-US"/>
           </a:p>
         </p:txBody>
       </p:sp>
@@ -9949,7 +9943,6 @@
               <a:rPr lang="en-US"/>
               <a:t>Pair&lt;A, B&gt;</a:t>
             </a:r>
-            <a:endParaRPr lang="en-US"/>
           </a:p>
         </p:txBody>
       </p:sp>
@@ -10109,7 +10102,6 @@
               <a:rPr lang="en-US"/>
               <a:t>Eq&lt;Pair&lt;...&gt;&gt;</a:t>
             </a:r>
-            <a:endParaRPr lang="en-US"/>
           </a:p>
         </p:txBody>
       </p:sp>
@@ -10228,7 +10220,6 @@
               <a:rPr lang="en-US"/>
               <a:t>Pair&lt;A, B&gt;</a:t>
             </a:r>
-            <a:endParaRPr lang="en-US"/>
           </a:p>
         </p:txBody>
       </p:sp>
@@ -10388,7 +10379,6 @@
               <a:rPr lang="en-US"/>
               <a:t>instance Eq Pair</a:t>
             </a:r>
-            <a:endParaRPr lang="en-US"/>
           </a:p>
         </p:txBody>
       </p:sp>

</xml_diff>